<commit_message>
version 1.1 is updated for draft document
</commit_message>
<xml_diff>
--- a/documents/SRS-BBTT.pptx
+++ b/documents/SRS-BBTT.pptx
@@ -291,7 +291,7 @@
             <a:fld id="{E518B2AA-5264-4634-A043-4F611592055A}" type="datetimeFigureOut">
               <a:rPr lang="en-US" smtClean="0"/>
               <a:pPr/>
-              <a:t>8/31/2019</a:t>
+              <a:t>11/5/2019</a:t>
             </a:fld>
             <a:endParaRPr lang="en-US"/>
           </a:p>
@@ -491,7 +491,7 @@
             <a:fld id="{E518B2AA-5264-4634-A043-4F611592055A}" type="datetimeFigureOut">
               <a:rPr lang="en-US" smtClean="0"/>
               <a:pPr/>
-              <a:t>8/31/2019</a:t>
+              <a:t>11/5/2019</a:t>
             </a:fld>
             <a:endParaRPr lang="en-US"/>
           </a:p>
@@ -701,7 +701,7 @@
             <a:fld id="{E518B2AA-5264-4634-A043-4F611592055A}" type="datetimeFigureOut">
               <a:rPr lang="en-US" smtClean="0"/>
               <a:pPr/>
-              <a:t>8/31/2019</a:t>
+              <a:t>11/5/2019</a:t>
             </a:fld>
             <a:endParaRPr lang="en-US"/>
           </a:p>
@@ -901,7 +901,7 @@
             <a:fld id="{E518B2AA-5264-4634-A043-4F611592055A}" type="datetimeFigureOut">
               <a:rPr lang="en-US" smtClean="0"/>
               <a:pPr/>
-              <a:t>8/31/2019</a:t>
+              <a:t>11/5/2019</a:t>
             </a:fld>
             <a:endParaRPr lang="en-US"/>
           </a:p>
@@ -1178,7 +1178,7 @@
             <a:fld id="{E518B2AA-5264-4634-A043-4F611592055A}" type="datetimeFigureOut">
               <a:rPr lang="en-US" smtClean="0"/>
               <a:pPr/>
-              <a:t>8/31/2019</a:t>
+              <a:t>11/5/2019</a:t>
             </a:fld>
             <a:endParaRPr lang="en-US"/>
           </a:p>
@@ -1445,7 +1445,7 @@
             <a:fld id="{E518B2AA-5264-4634-A043-4F611592055A}" type="datetimeFigureOut">
               <a:rPr lang="en-US" smtClean="0"/>
               <a:pPr/>
-              <a:t>8/31/2019</a:t>
+              <a:t>11/5/2019</a:t>
             </a:fld>
             <a:endParaRPr lang="en-US"/>
           </a:p>
@@ -1859,7 +1859,7 @@
             <a:fld id="{E518B2AA-5264-4634-A043-4F611592055A}" type="datetimeFigureOut">
               <a:rPr lang="en-US" smtClean="0"/>
               <a:pPr/>
-              <a:t>8/31/2019</a:t>
+              <a:t>11/5/2019</a:t>
             </a:fld>
             <a:endParaRPr lang="en-US"/>
           </a:p>
@@ -2002,7 +2002,7 @@
             <a:fld id="{E518B2AA-5264-4634-A043-4F611592055A}" type="datetimeFigureOut">
               <a:rPr lang="en-US" smtClean="0"/>
               <a:pPr/>
-              <a:t>8/31/2019</a:t>
+              <a:t>11/5/2019</a:t>
             </a:fld>
             <a:endParaRPr lang="en-US"/>
           </a:p>
@@ -2117,7 +2117,7 @@
             <a:fld id="{E518B2AA-5264-4634-A043-4F611592055A}" type="datetimeFigureOut">
               <a:rPr lang="en-US" smtClean="0"/>
               <a:pPr/>
-              <a:t>8/31/2019</a:t>
+              <a:t>11/5/2019</a:t>
             </a:fld>
             <a:endParaRPr lang="en-US"/>
           </a:p>
@@ -2430,7 +2430,7 @@
             <a:fld id="{E518B2AA-5264-4634-A043-4F611592055A}" type="datetimeFigureOut">
               <a:rPr lang="en-US" smtClean="0"/>
               <a:pPr/>
-              <a:t>8/31/2019</a:t>
+              <a:t>11/5/2019</a:t>
             </a:fld>
             <a:endParaRPr lang="en-US"/>
           </a:p>
@@ -2720,7 +2720,7 @@
             <a:fld id="{E518B2AA-5264-4634-A043-4F611592055A}" type="datetimeFigureOut">
               <a:rPr lang="en-US" smtClean="0"/>
               <a:pPr/>
-              <a:t>8/31/2019</a:t>
+              <a:t>11/5/2019</a:t>
             </a:fld>
             <a:endParaRPr lang="en-US"/>
           </a:p>
@@ -2963,7 +2963,7 @@
             <a:fld id="{E518B2AA-5264-4634-A043-4F611592055A}" type="datetimeFigureOut">
               <a:rPr lang="en-US" smtClean="0"/>
               <a:pPr/>
-              <a:t>8/31/2019</a:t>
+              <a:t>11/5/2019</a:t>
             </a:fld>
             <a:endParaRPr lang="en-US"/>
           </a:p>
@@ -7534,23 +7534,7 @@
                   <a:schemeClr val="tx1"/>
                 </a:solidFill>
               </a:rPr>
-              <a:t>Braille Cell </a:t>
-            </a:r>
-            <a:r>
-              <a:rPr lang="en-US" sz="2800" b="1" dirty="0" err="1">
-                <a:solidFill>
-                  <a:schemeClr val="tx1"/>
-                </a:solidFill>
-              </a:rPr>
-              <a:t>Framming</a:t>
-            </a:r>
-            <a:r>
-              <a:rPr lang="en-US" sz="2800" b="1" dirty="0">
-                <a:solidFill>
-                  <a:schemeClr val="tx1"/>
-                </a:solidFill>
-              </a:rPr>
-              <a:t>  </a:t>
+              <a:t>Braille Cell Framing  </a:t>
             </a:r>
           </a:p>
         </p:txBody>

</xml_diff>